<commit_message>
Final Presentation for Dec 6
</commit_message>
<xml_diff>
--- a/Choosing a Social Network Tool (December 2013).pptx
+++ b/Choosing a Social Network Tool (December 2013).pptx
@@ -5,7 +5,7 @@
     <p:sldMasterId id="2147483840" r:id="rId1"/>
   </p:sldMasterIdLst>
   <p:notesMasterIdLst>
-    <p:notesMasterId r:id="rId19"/>
+    <p:notesMasterId r:id="rId20"/>
   </p:notesMasterIdLst>
   <p:sldIdLst>
     <p:sldId id="256" r:id="rId2"/>
@@ -24,7 +24,8 @@
     <p:sldId id="269" r:id="rId15"/>
     <p:sldId id="270" r:id="rId16"/>
     <p:sldId id="271" r:id="rId17"/>
-    <p:sldId id="274" r:id="rId18"/>
+    <p:sldId id="276" r:id="rId18"/>
+    <p:sldId id="274" r:id="rId19"/>
   </p:sldIdLst>
   <p:sldSz cx="12192000" cy="6858000"/>
   <p:notesSz cx="6858000" cy="9144000"/>
@@ -4701,6 +4702,2492 @@
 </file>
 
 <file path=ppt/slides/slide17.xml><?xml version="1.0" encoding="utf-8"?>
+<p:sld xmlns:a="http://schemas.openxmlformats.org/drawingml/2006/main" xmlns:r="http://schemas.openxmlformats.org/officeDocument/2006/relationships" xmlns:p="http://schemas.openxmlformats.org/presentationml/2006/main">
+  <p:cSld>
+    <p:spTree>
+      <p:nvGrpSpPr>
+        <p:cNvPr id="1" name=""/>
+        <p:cNvGrpSpPr/>
+        <p:nvPr/>
+      </p:nvGrpSpPr>
+      <p:grpSpPr>
+        <a:xfrm>
+          <a:off x="0" y="0"/>
+          <a:ext cx="0" cy="0"/>
+          <a:chOff x="0" y="0"/>
+          <a:chExt cx="0" cy="0"/>
+        </a:xfrm>
+      </p:grpSpPr>
+      <p:sp>
+        <p:nvSpPr>
+          <p:cNvPr id="2" name="Title 1"/>
+          <p:cNvSpPr>
+            <a:spLocks noGrp="1"/>
+          </p:cNvSpPr>
+          <p:nvPr>
+            <p:ph type="title"/>
+          </p:nvPr>
+        </p:nvSpPr>
+        <p:spPr/>
+        <p:txBody>
+          <a:bodyPr/>
+          <a:lstStyle/>
+          <a:p>
+            <a:r>
+              <a:rPr lang="en-US" dirty="0" smtClean="0"/>
+              <a:t>The Payoff!</a:t>
+            </a:r>
+            <a:endParaRPr lang="en-US" dirty="0"/>
+          </a:p>
+        </p:txBody>
+      </p:sp>
+      <p:graphicFrame>
+        <p:nvGraphicFramePr>
+          <p:cNvPr id="4" name="Content Placeholder 3"/>
+          <p:cNvGraphicFramePr>
+            <a:graphicFrameLocks noGrp="1"/>
+          </p:cNvGraphicFramePr>
+          <p:nvPr>
+            <p:ph idx="1"/>
+            <p:extLst>
+              <p:ext uri="{D42A27DB-BD31-4B8C-83A1-F6EECF244321}">
+                <p14:modId xmlns:p14="http://schemas.microsoft.com/office/powerpoint/2010/main" val="1496933847"/>
+              </p:ext>
+            </p:extLst>
+          </p:nvPr>
+        </p:nvGraphicFramePr>
+        <p:xfrm>
+          <a:off x="1262063" y="1875715"/>
+          <a:ext cx="8661865" cy="4501612"/>
+        </p:xfrm>
+        <a:graphic>
+          <a:graphicData uri="http://schemas.openxmlformats.org/drawingml/2006/table">
+            <a:tbl>
+              <a:tblPr firstRow="1" firstCol="1" bandRow="1">
+                <a:tableStyleId>{5C22544A-7EE6-4342-B048-85BDC9FD1C3A}</a:tableStyleId>
+              </a:tblPr>
+              <a:tblGrid>
+                <a:gridCol w="1732373"/>
+                <a:gridCol w="1732373"/>
+                <a:gridCol w="1732373"/>
+                <a:gridCol w="1732373"/>
+                <a:gridCol w="1732373"/>
+              </a:tblGrid>
+              <a:tr h="158145">
+                <a:tc>
+                  <a:txBody>
+                    <a:bodyPr/>
+                    <a:lstStyle/>
+                    <a:p>
+                      <a:pPr marL="0" marR="0" algn="l">
+                        <a:lnSpc>
+                          <a:spcPct val="115000"/>
+                        </a:lnSpc>
+                        <a:spcBef>
+                          <a:spcPts val="0"/>
+                        </a:spcBef>
+                        <a:spcAft>
+                          <a:spcPts val="0"/>
+                        </a:spcAft>
+                      </a:pPr>
+                      <a:r>
+                        <a:rPr lang="en-US" sz="800">
+                          <a:effectLst/>
+                        </a:rPr>
+                        <a:t> </a:t>
+                      </a:r>
+                      <a:endParaRPr lang="en-US" sz="1100">
+                        <a:effectLst/>
+                        <a:latin typeface="Calibri" panose="020F0502020204030204" pitchFamily="34" charset="0"/>
+                        <a:ea typeface="MS Mincho" panose="02020609040205080304" pitchFamily="49" charset="-128"/>
+                        <a:cs typeface="Arial" panose="020B0604020202020204" pitchFamily="34" charset="0"/>
+                      </a:endParaRPr>
+                    </a:p>
+                  </a:txBody>
+                  <a:tcPr marL="68580" marR="68580" marT="0" marB="0"/>
+                </a:tc>
+                <a:tc>
+                  <a:txBody>
+                    <a:bodyPr/>
+                    <a:lstStyle/>
+                    <a:p>
+                      <a:pPr marL="0" marR="0" algn="l">
+                        <a:lnSpc>
+                          <a:spcPct val="115000"/>
+                        </a:lnSpc>
+                        <a:spcBef>
+                          <a:spcPts val="0"/>
+                        </a:spcBef>
+                        <a:spcAft>
+                          <a:spcPts val="0"/>
+                        </a:spcAft>
+                      </a:pPr>
+                      <a:r>
+                        <a:rPr lang="en-US" sz="800">
+                          <a:effectLst/>
+                        </a:rPr>
+                        <a:t>Model I</a:t>
+                      </a:r>
+                      <a:endParaRPr lang="en-US" sz="1100">
+                        <a:effectLst/>
+                        <a:latin typeface="Calibri" panose="020F0502020204030204" pitchFamily="34" charset="0"/>
+                        <a:ea typeface="MS Mincho" panose="02020609040205080304" pitchFamily="49" charset="-128"/>
+                        <a:cs typeface="Arial" panose="020B0604020202020204" pitchFamily="34" charset="0"/>
+                      </a:endParaRPr>
+                    </a:p>
+                  </a:txBody>
+                  <a:tcPr marL="68580" marR="68580" marT="0" marB="0"/>
+                </a:tc>
+                <a:tc>
+                  <a:txBody>
+                    <a:bodyPr/>
+                    <a:lstStyle/>
+                    <a:p>
+                      <a:pPr marL="0" marR="0" algn="l">
+                        <a:lnSpc>
+                          <a:spcPct val="115000"/>
+                        </a:lnSpc>
+                        <a:spcBef>
+                          <a:spcPts val="0"/>
+                        </a:spcBef>
+                        <a:spcAft>
+                          <a:spcPts val="0"/>
+                        </a:spcAft>
+                      </a:pPr>
+                      <a:r>
+                        <a:rPr lang="en-US" sz="800">
+                          <a:effectLst/>
+                        </a:rPr>
+                        <a:t>Model II</a:t>
+                      </a:r>
+                      <a:endParaRPr lang="en-US" sz="1100">
+                        <a:effectLst/>
+                        <a:latin typeface="Calibri" panose="020F0502020204030204" pitchFamily="34" charset="0"/>
+                        <a:ea typeface="MS Mincho" panose="02020609040205080304" pitchFamily="49" charset="-128"/>
+                        <a:cs typeface="Arial" panose="020B0604020202020204" pitchFamily="34" charset="0"/>
+                      </a:endParaRPr>
+                    </a:p>
+                  </a:txBody>
+                  <a:tcPr marL="68580" marR="68580" marT="0" marB="0"/>
+                </a:tc>
+                <a:tc>
+                  <a:txBody>
+                    <a:bodyPr/>
+                    <a:lstStyle/>
+                    <a:p>
+                      <a:pPr marL="0" marR="0" algn="l">
+                        <a:lnSpc>
+                          <a:spcPct val="115000"/>
+                        </a:lnSpc>
+                        <a:spcBef>
+                          <a:spcPts val="0"/>
+                        </a:spcBef>
+                        <a:spcAft>
+                          <a:spcPts val="0"/>
+                        </a:spcAft>
+                      </a:pPr>
+                      <a:r>
+                        <a:rPr lang="en-US" sz="800">
+                          <a:effectLst/>
+                        </a:rPr>
+                        <a:t>Model III</a:t>
+                      </a:r>
+                      <a:endParaRPr lang="en-US" sz="1100">
+                        <a:effectLst/>
+                        <a:latin typeface="Calibri" panose="020F0502020204030204" pitchFamily="34" charset="0"/>
+                        <a:ea typeface="MS Mincho" panose="02020609040205080304" pitchFamily="49" charset="-128"/>
+                        <a:cs typeface="Arial" panose="020B0604020202020204" pitchFamily="34" charset="0"/>
+                      </a:endParaRPr>
+                    </a:p>
+                  </a:txBody>
+                  <a:tcPr marL="68580" marR="68580" marT="0" marB="0"/>
+                </a:tc>
+                <a:tc>
+                  <a:txBody>
+                    <a:bodyPr/>
+                    <a:lstStyle/>
+                    <a:p>
+                      <a:pPr marL="0" marR="0" algn="l">
+                        <a:lnSpc>
+                          <a:spcPct val="115000"/>
+                        </a:lnSpc>
+                        <a:spcBef>
+                          <a:spcPts val="0"/>
+                        </a:spcBef>
+                        <a:spcAft>
+                          <a:spcPts val="0"/>
+                        </a:spcAft>
+                      </a:pPr>
+                      <a:r>
+                        <a:rPr lang="en-US" sz="800">
+                          <a:effectLst/>
+                        </a:rPr>
+                        <a:t>Model IV</a:t>
+                      </a:r>
+                      <a:endParaRPr lang="en-US" sz="1100">
+                        <a:effectLst/>
+                        <a:latin typeface="Calibri" panose="020F0502020204030204" pitchFamily="34" charset="0"/>
+                        <a:ea typeface="MS Mincho" panose="02020609040205080304" pitchFamily="49" charset="-128"/>
+                        <a:cs typeface="Arial" panose="020B0604020202020204" pitchFamily="34" charset="0"/>
+                      </a:endParaRPr>
+                    </a:p>
+                  </a:txBody>
+                  <a:tcPr marL="68580" marR="68580" marT="0" marB="0"/>
+                </a:tc>
+              </a:tr>
+              <a:tr h="1004036">
+                <a:tc>
+                  <a:txBody>
+                    <a:bodyPr/>
+                    <a:lstStyle/>
+                    <a:p>
+                      <a:pPr marL="0" marR="0" algn="l">
+                        <a:lnSpc>
+                          <a:spcPct val="115000"/>
+                        </a:lnSpc>
+                        <a:spcBef>
+                          <a:spcPts val="0"/>
+                        </a:spcBef>
+                        <a:spcAft>
+                          <a:spcPts val="0"/>
+                        </a:spcAft>
+                      </a:pPr>
+                      <a:r>
+                        <a:rPr lang="en-US" sz="800">
+                          <a:effectLst/>
+                        </a:rPr>
+                        <a:t>Ego Religiosity</a:t>
+                      </a:r>
+                      <a:endParaRPr lang="en-US" sz="1100">
+                        <a:effectLst/>
+                      </a:endParaRPr>
+                    </a:p>
+                    <a:p>
+                      <a:pPr marL="137160" marR="0" indent="-137160" algn="l">
+                        <a:lnSpc>
+                          <a:spcPct val="115000"/>
+                        </a:lnSpc>
+                        <a:spcBef>
+                          <a:spcPts val="0"/>
+                        </a:spcBef>
+                        <a:spcAft>
+                          <a:spcPts val="0"/>
+                        </a:spcAft>
+                      </a:pPr>
+                      <a:r>
+                        <a:rPr lang="en-US" sz="800">
+                          <a:effectLst/>
+                        </a:rPr>
+                        <a:t>Worship Attendance</a:t>
+                      </a:r>
+                      <a:endParaRPr lang="en-US" sz="1100">
+                        <a:effectLst/>
+                      </a:endParaRPr>
+                    </a:p>
+                    <a:p>
+                      <a:pPr marL="137160" marR="0" indent="-137160" algn="l">
+                        <a:lnSpc>
+                          <a:spcPct val="115000"/>
+                        </a:lnSpc>
+                        <a:spcBef>
+                          <a:spcPts val="0"/>
+                        </a:spcBef>
+                        <a:spcAft>
+                          <a:spcPts val="0"/>
+                        </a:spcAft>
+                      </a:pPr>
+                      <a:r>
+                        <a:rPr lang="en-US" sz="800">
+                          <a:effectLst/>
+                        </a:rPr>
+                        <a:t>Youth Group Participation</a:t>
+                      </a:r>
+                      <a:endParaRPr lang="en-US" sz="1100">
+                        <a:effectLst/>
+                      </a:endParaRPr>
+                    </a:p>
+                    <a:p>
+                      <a:pPr marL="137160" marR="0" indent="-137160" algn="l">
+                        <a:lnSpc>
+                          <a:spcPct val="115000"/>
+                        </a:lnSpc>
+                        <a:spcBef>
+                          <a:spcPts val="0"/>
+                        </a:spcBef>
+                        <a:spcAft>
+                          <a:spcPts val="0"/>
+                        </a:spcAft>
+                      </a:pPr>
+                      <a:r>
+                        <a:rPr lang="en-US" sz="800">
+                          <a:effectLst/>
+                        </a:rPr>
+                        <a:t>Frequency of Prayer</a:t>
+                      </a:r>
+                      <a:endParaRPr lang="en-US" sz="1100">
+                        <a:effectLst/>
+                      </a:endParaRPr>
+                    </a:p>
+                    <a:p>
+                      <a:pPr marL="137160" marR="0" indent="-137160" algn="l">
+                        <a:lnSpc>
+                          <a:spcPct val="115000"/>
+                        </a:lnSpc>
+                        <a:spcBef>
+                          <a:spcPts val="0"/>
+                        </a:spcBef>
+                        <a:spcAft>
+                          <a:spcPts val="0"/>
+                        </a:spcAft>
+                      </a:pPr>
+                      <a:r>
+                        <a:rPr lang="en-US" sz="800">
+                          <a:effectLst/>
+                        </a:rPr>
+                        <a:t>Biblical Literalism</a:t>
+                      </a:r>
+                      <a:endParaRPr lang="en-US" sz="1100">
+                        <a:effectLst/>
+                      </a:endParaRPr>
+                    </a:p>
+                    <a:p>
+                      <a:pPr marL="137160" marR="0" indent="-137160" algn="l">
+                        <a:lnSpc>
+                          <a:spcPct val="115000"/>
+                        </a:lnSpc>
+                        <a:spcBef>
+                          <a:spcPts val="0"/>
+                        </a:spcBef>
+                        <a:spcAft>
+                          <a:spcPts val="0"/>
+                        </a:spcAft>
+                      </a:pPr>
+                      <a:r>
+                        <a:rPr lang="en-US" sz="800">
+                          <a:effectLst/>
+                        </a:rPr>
+                        <a:t>Born-again</a:t>
+                      </a:r>
+                      <a:endParaRPr lang="en-US" sz="1100">
+                        <a:effectLst/>
+                        <a:latin typeface="Calibri" panose="020F0502020204030204" pitchFamily="34" charset="0"/>
+                        <a:ea typeface="MS Mincho" panose="02020609040205080304" pitchFamily="49" charset="-128"/>
+                        <a:cs typeface="Arial" panose="020B0604020202020204" pitchFamily="34" charset="0"/>
+                      </a:endParaRPr>
+                    </a:p>
+                  </a:txBody>
+                  <a:tcPr marL="68580" marR="68580" marT="0" marB="0"/>
+                </a:tc>
+                <a:tc>
+                  <a:txBody>
+                    <a:bodyPr/>
+                    <a:lstStyle/>
+                    <a:p>
+                      <a:pPr marL="0" marR="0" algn="l">
+                        <a:lnSpc>
+                          <a:spcPct val="115000"/>
+                        </a:lnSpc>
+                        <a:spcBef>
+                          <a:spcPts val="0"/>
+                        </a:spcBef>
+                        <a:spcAft>
+                          <a:spcPts val="0"/>
+                        </a:spcAft>
+                      </a:pPr>
+                      <a:r>
+                        <a:rPr lang="en-US" sz="800">
+                          <a:effectLst/>
+                        </a:rPr>
+                        <a:t> </a:t>
+                      </a:r>
+                      <a:endParaRPr lang="en-US" sz="1100">
+                        <a:effectLst/>
+                      </a:endParaRPr>
+                    </a:p>
+                    <a:p>
+                      <a:pPr marL="0" marR="0" algn="l">
+                        <a:lnSpc>
+                          <a:spcPct val="115000"/>
+                        </a:lnSpc>
+                        <a:spcBef>
+                          <a:spcPts val="0"/>
+                        </a:spcBef>
+                        <a:spcAft>
+                          <a:spcPts val="0"/>
+                        </a:spcAft>
+                      </a:pPr>
+                      <a:r>
+                        <a:rPr lang="en-US" sz="800">
+                          <a:effectLst/>
+                        </a:rPr>
+                        <a:t>.173 (.016)***</a:t>
+                      </a:r>
+                      <a:endParaRPr lang="en-US" sz="1100">
+                        <a:effectLst/>
+                      </a:endParaRPr>
+                    </a:p>
+                    <a:p>
+                      <a:pPr marL="0" marR="0" algn="l">
+                        <a:lnSpc>
+                          <a:spcPct val="115000"/>
+                        </a:lnSpc>
+                        <a:spcBef>
+                          <a:spcPts val="0"/>
+                        </a:spcBef>
+                        <a:spcAft>
+                          <a:spcPts val="0"/>
+                        </a:spcAft>
+                      </a:pPr>
+                      <a:r>
+                        <a:rPr lang="en-US" sz="800">
+                          <a:effectLst/>
+                        </a:rPr>
+                        <a:t>.030 (.014)*</a:t>
+                      </a:r>
+                      <a:endParaRPr lang="en-US" sz="1100">
+                        <a:effectLst/>
+                      </a:endParaRPr>
+                    </a:p>
+                    <a:p>
+                      <a:pPr marL="0" marR="0" algn="l">
+                        <a:lnSpc>
+                          <a:spcPct val="115000"/>
+                        </a:lnSpc>
+                        <a:spcBef>
+                          <a:spcPts val="0"/>
+                        </a:spcBef>
+                        <a:spcAft>
+                          <a:spcPts val="0"/>
+                        </a:spcAft>
+                      </a:pPr>
+                      <a:r>
+                        <a:rPr lang="en-US" sz="800">
+                          <a:effectLst/>
+                        </a:rPr>
+                        <a:t>.232 (.013)***</a:t>
+                      </a:r>
+                      <a:endParaRPr lang="en-US" sz="1100">
+                        <a:effectLst/>
+                      </a:endParaRPr>
+                    </a:p>
+                    <a:p>
+                      <a:pPr marL="0" marR="0" algn="l">
+                        <a:lnSpc>
+                          <a:spcPct val="115000"/>
+                        </a:lnSpc>
+                        <a:spcBef>
+                          <a:spcPts val="0"/>
+                        </a:spcBef>
+                        <a:spcAft>
+                          <a:spcPts val="0"/>
+                        </a:spcAft>
+                      </a:pPr>
+                      <a:r>
+                        <a:rPr lang="en-US" sz="800">
+                          <a:effectLst/>
+                        </a:rPr>
+                        <a:t>.377 (.034)***</a:t>
+                      </a:r>
+                      <a:endParaRPr lang="en-US" sz="1100">
+                        <a:effectLst/>
+                      </a:endParaRPr>
+                    </a:p>
+                    <a:p>
+                      <a:pPr marL="0" marR="0" algn="l">
+                        <a:lnSpc>
+                          <a:spcPct val="115000"/>
+                        </a:lnSpc>
+                        <a:spcBef>
+                          <a:spcPts val="0"/>
+                        </a:spcBef>
+                        <a:spcAft>
+                          <a:spcPts val="0"/>
+                        </a:spcAft>
+                      </a:pPr>
+                      <a:r>
+                        <a:rPr lang="en-US" sz="800">
+                          <a:effectLst/>
+                        </a:rPr>
+                        <a:t>.141 (.033)***</a:t>
+                      </a:r>
+                      <a:endParaRPr lang="en-US" sz="1100">
+                        <a:effectLst/>
+                        <a:latin typeface="Calibri" panose="020F0502020204030204" pitchFamily="34" charset="0"/>
+                        <a:ea typeface="MS Mincho" panose="02020609040205080304" pitchFamily="49" charset="-128"/>
+                        <a:cs typeface="Arial" panose="020B0604020202020204" pitchFamily="34" charset="0"/>
+                      </a:endParaRPr>
+                    </a:p>
+                  </a:txBody>
+                  <a:tcPr marL="68580" marR="68580" marT="0" marB="0"/>
+                </a:tc>
+                <a:tc>
+                  <a:txBody>
+                    <a:bodyPr/>
+                    <a:lstStyle/>
+                    <a:p>
+                      <a:pPr marL="0" marR="0" algn="l">
+                        <a:lnSpc>
+                          <a:spcPct val="115000"/>
+                        </a:lnSpc>
+                        <a:spcBef>
+                          <a:spcPts val="0"/>
+                        </a:spcBef>
+                        <a:spcAft>
+                          <a:spcPts val="0"/>
+                        </a:spcAft>
+                      </a:pPr>
+                      <a:r>
+                        <a:rPr lang="en-US" sz="800">
+                          <a:effectLst/>
+                        </a:rPr>
+                        <a:t> </a:t>
+                      </a:r>
+                      <a:endParaRPr lang="en-US" sz="1100">
+                        <a:effectLst/>
+                      </a:endParaRPr>
+                    </a:p>
+                    <a:p>
+                      <a:pPr marL="0" marR="0" algn="l">
+                        <a:lnSpc>
+                          <a:spcPct val="115000"/>
+                        </a:lnSpc>
+                        <a:spcBef>
+                          <a:spcPts val="0"/>
+                        </a:spcBef>
+                        <a:spcAft>
+                          <a:spcPts val="0"/>
+                        </a:spcAft>
+                      </a:pPr>
+                      <a:r>
+                        <a:rPr lang="en-US" sz="800">
+                          <a:effectLst/>
+                        </a:rPr>
+                        <a:t>.168 (.016)***</a:t>
+                      </a:r>
+                      <a:endParaRPr lang="en-US" sz="1100">
+                        <a:effectLst/>
+                      </a:endParaRPr>
+                    </a:p>
+                    <a:p>
+                      <a:pPr marL="0" marR="0" algn="l">
+                        <a:lnSpc>
+                          <a:spcPct val="115000"/>
+                        </a:lnSpc>
+                        <a:spcBef>
+                          <a:spcPts val="0"/>
+                        </a:spcBef>
+                        <a:spcAft>
+                          <a:spcPts val="0"/>
+                        </a:spcAft>
+                      </a:pPr>
+                      <a:r>
+                        <a:rPr lang="en-US" sz="800">
+                          <a:effectLst/>
+                        </a:rPr>
+                        <a:t>.035 (.014)*</a:t>
+                      </a:r>
+                      <a:endParaRPr lang="en-US" sz="1100">
+                        <a:effectLst/>
+                      </a:endParaRPr>
+                    </a:p>
+                    <a:p>
+                      <a:pPr marL="0" marR="0" algn="l">
+                        <a:lnSpc>
+                          <a:spcPct val="115000"/>
+                        </a:lnSpc>
+                        <a:spcBef>
+                          <a:spcPts val="0"/>
+                        </a:spcBef>
+                        <a:spcAft>
+                          <a:spcPts val="0"/>
+                        </a:spcAft>
+                      </a:pPr>
+                      <a:r>
+                        <a:rPr lang="en-US" sz="800">
+                          <a:effectLst/>
+                        </a:rPr>
+                        <a:t>.227 (.014)***</a:t>
+                      </a:r>
+                      <a:endParaRPr lang="en-US" sz="1100">
+                        <a:effectLst/>
+                      </a:endParaRPr>
+                    </a:p>
+                    <a:p>
+                      <a:pPr marL="0" marR="0" algn="l">
+                        <a:lnSpc>
+                          <a:spcPct val="115000"/>
+                        </a:lnSpc>
+                        <a:spcBef>
+                          <a:spcPts val="0"/>
+                        </a:spcBef>
+                        <a:spcAft>
+                          <a:spcPts val="0"/>
+                        </a:spcAft>
+                      </a:pPr>
+                      <a:r>
+                        <a:rPr lang="en-US" sz="800">
+                          <a:effectLst/>
+                        </a:rPr>
+                        <a:t>.371 (.034)***</a:t>
+                      </a:r>
+                      <a:endParaRPr lang="en-US" sz="1100">
+                        <a:effectLst/>
+                      </a:endParaRPr>
+                    </a:p>
+                    <a:p>
+                      <a:pPr marL="0" marR="0" algn="l">
+                        <a:lnSpc>
+                          <a:spcPct val="115000"/>
+                        </a:lnSpc>
+                        <a:spcBef>
+                          <a:spcPts val="0"/>
+                        </a:spcBef>
+                        <a:spcAft>
+                          <a:spcPts val="0"/>
+                        </a:spcAft>
+                      </a:pPr>
+                      <a:r>
+                        <a:rPr lang="en-US" sz="800">
+                          <a:effectLst/>
+                        </a:rPr>
+                        <a:t>.146 (.032)***</a:t>
+                      </a:r>
+                      <a:endParaRPr lang="en-US" sz="1100">
+                        <a:effectLst/>
+                        <a:latin typeface="Calibri" panose="020F0502020204030204" pitchFamily="34" charset="0"/>
+                        <a:ea typeface="MS Mincho" panose="02020609040205080304" pitchFamily="49" charset="-128"/>
+                        <a:cs typeface="Arial" panose="020B0604020202020204" pitchFamily="34" charset="0"/>
+                      </a:endParaRPr>
+                    </a:p>
+                  </a:txBody>
+                  <a:tcPr marL="68580" marR="68580" marT="0" marB="0"/>
+                </a:tc>
+                <a:tc>
+                  <a:txBody>
+                    <a:bodyPr/>
+                    <a:lstStyle/>
+                    <a:p>
+                      <a:pPr marL="0" marR="0" algn="l">
+                        <a:lnSpc>
+                          <a:spcPct val="115000"/>
+                        </a:lnSpc>
+                        <a:spcBef>
+                          <a:spcPts val="0"/>
+                        </a:spcBef>
+                        <a:spcAft>
+                          <a:spcPts val="0"/>
+                        </a:spcAft>
+                      </a:pPr>
+                      <a:r>
+                        <a:rPr lang="en-US" sz="800">
+                          <a:effectLst/>
+                        </a:rPr>
+                        <a:t> </a:t>
+                      </a:r>
+                      <a:endParaRPr lang="en-US" sz="1100">
+                        <a:effectLst/>
+                      </a:endParaRPr>
+                    </a:p>
+                    <a:p>
+                      <a:pPr marL="0" marR="0" algn="l">
+                        <a:lnSpc>
+                          <a:spcPct val="115000"/>
+                        </a:lnSpc>
+                        <a:spcBef>
+                          <a:spcPts val="0"/>
+                        </a:spcBef>
+                        <a:spcAft>
+                          <a:spcPts val="0"/>
+                        </a:spcAft>
+                      </a:pPr>
+                      <a:r>
+                        <a:rPr lang="en-US" sz="800">
+                          <a:effectLst/>
+                        </a:rPr>
+                        <a:t>.160 (.016)***</a:t>
+                      </a:r>
+                      <a:endParaRPr lang="en-US" sz="1100">
+                        <a:effectLst/>
+                      </a:endParaRPr>
+                    </a:p>
+                    <a:p>
+                      <a:pPr marL="0" marR="0" algn="l">
+                        <a:lnSpc>
+                          <a:spcPct val="115000"/>
+                        </a:lnSpc>
+                        <a:spcBef>
+                          <a:spcPts val="0"/>
+                        </a:spcBef>
+                        <a:spcAft>
+                          <a:spcPts val="0"/>
+                        </a:spcAft>
+                      </a:pPr>
+                      <a:r>
+                        <a:rPr lang="en-US" sz="800">
+                          <a:effectLst/>
+                        </a:rPr>
+                        <a:t>.038 (.013)**</a:t>
+                      </a:r>
+                      <a:endParaRPr lang="en-US" sz="1100">
+                        <a:effectLst/>
+                      </a:endParaRPr>
+                    </a:p>
+                    <a:p>
+                      <a:pPr marL="0" marR="0" algn="l">
+                        <a:lnSpc>
+                          <a:spcPct val="115000"/>
+                        </a:lnSpc>
+                        <a:spcBef>
+                          <a:spcPts val="0"/>
+                        </a:spcBef>
+                        <a:spcAft>
+                          <a:spcPts val="0"/>
+                        </a:spcAft>
+                      </a:pPr>
+                      <a:r>
+                        <a:rPr lang="en-US" sz="800">
+                          <a:effectLst/>
+                        </a:rPr>
+                        <a:t>.219 (.013)***</a:t>
+                      </a:r>
+                      <a:endParaRPr lang="en-US" sz="1100">
+                        <a:effectLst/>
+                      </a:endParaRPr>
+                    </a:p>
+                    <a:p>
+                      <a:pPr marL="0" marR="0" algn="l">
+                        <a:lnSpc>
+                          <a:spcPct val="115000"/>
+                        </a:lnSpc>
+                        <a:spcBef>
+                          <a:spcPts val="0"/>
+                        </a:spcBef>
+                        <a:spcAft>
+                          <a:spcPts val="0"/>
+                        </a:spcAft>
+                      </a:pPr>
+                      <a:r>
+                        <a:rPr lang="en-US" sz="800">
+                          <a:effectLst/>
+                        </a:rPr>
+                        <a:t>.363 (.034)***</a:t>
+                      </a:r>
+                      <a:endParaRPr lang="en-US" sz="1100">
+                        <a:effectLst/>
+                      </a:endParaRPr>
+                    </a:p>
+                    <a:p>
+                      <a:pPr marL="0" marR="0" algn="l">
+                        <a:lnSpc>
+                          <a:spcPct val="115000"/>
+                        </a:lnSpc>
+                        <a:spcBef>
+                          <a:spcPts val="0"/>
+                        </a:spcBef>
+                        <a:spcAft>
+                          <a:spcPts val="0"/>
+                        </a:spcAft>
+                      </a:pPr>
+                      <a:r>
+                        <a:rPr lang="en-US" sz="800">
+                          <a:effectLst/>
+                        </a:rPr>
+                        <a:t>.154 (.032)***</a:t>
+                      </a:r>
+                      <a:endParaRPr lang="en-US" sz="1100">
+                        <a:effectLst/>
+                        <a:latin typeface="Calibri" panose="020F0502020204030204" pitchFamily="34" charset="0"/>
+                        <a:ea typeface="MS Mincho" panose="02020609040205080304" pitchFamily="49" charset="-128"/>
+                        <a:cs typeface="Arial" panose="020B0604020202020204" pitchFamily="34" charset="0"/>
+                      </a:endParaRPr>
+                    </a:p>
+                  </a:txBody>
+                  <a:tcPr marL="68580" marR="68580" marT="0" marB="0"/>
+                </a:tc>
+                <a:tc>
+                  <a:txBody>
+                    <a:bodyPr/>
+                    <a:lstStyle/>
+                    <a:p>
+                      <a:pPr marL="0" marR="0" algn="l">
+                        <a:lnSpc>
+                          <a:spcPct val="115000"/>
+                        </a:lnSpc>
+                        <a:spcBef>
+                          <a:spcPts val="0"/>
+                        </a:spcBef>
+                        <a:spcAft>
+                          <a:spcPts val="0"/>
+                        </a:spcAft>
+                      </a:pPr>
+                      <a:r>
+                        <a:rPr lang="en-US" sz="800">
+                          <a:effectLst/>
+                        </a:rPr>
+                        <a:t> </a:t>
+                      </a:r>
+                      <a:endParaRPr lang="en-US" sz="1100">
+                        <a:effectLst/>
+                      </a:endParaRPr>
+                    </a:p>
+                    <a:p>
+                      <a:pPr marL="0" marR="0" algn="l">
+                        <a:lnSpc>
+                          <a:spcPct val="115000"/>
+                        </a:lnSpc>
+                        <a:spcBef>
+                          <a:spcPts val="0"/>
+                        </a:spcBef>
+                        <a:spcAft>
+                          <a:spcPts val="0"/>
+                        </a:spcAft>
+                      </a:pPr>
+                      <a:r>
+                        <a:rPr lang="en-US" sz="800">
+                          <a:effectLst/>
+                        </a:rPr>
+                        <a:t>.154 (.016)***</a:t>
+                      </a:r>
+                      <a:endParaRPr lang="en-US" sz="1100">
+                        <a:effectLst/>
+                      </a:endParaRPr>
+                    </a:p>
+                    <a:p>
+                      <a:pPr marL="0" marR="0" algn="l">
+                        <a:lnSpc>
+                          <a:spcPct val="115000"/>
+                        </a:lnSpc>
+                        <a:spcBef>
+                          <a:spcPts val="0"/>
+                        </a:spcBef>
+                        <a:spcAft>
+                          <a:spcPts val="0"/>
+                        </a:spcAft>
+                      </a:pPr>
+                      <a:r>
+                        <a:rPr lang="en-US" sz="800">
+                          <a:effectLst/>
+                        </a:rPr>
+                        <a:t>.036 (.013)**</a:t>
+                      </a:r>
+                      <a:endParaRPr lang="en-US" sz="1100">
+                        <a:effectLst/>
+                      </a:endParaRPr>
+                    </a:p>
+                    <a:p>
+                      <a:pPr marL="0" marR="0" algn="l">
+                        <a:lnSpc>
+                          <a:spcPct val="115000"/>
+                        </a:lnSpc>
+                        <a:spcBef>
+                          <a:spcPts val="0"/>
+                        </a:spcBef>
+                        <a:spcAft>
+                          <a:spcPts val="0"/>
+                        </a:spcAft>
+                      </a:pPr>
+                      <a:r>
+                        <a:rPr lang="en-US" sz="800">
+                          <a:effectLst/>
+                        </a:rPr>
+                        <a:t>.212 (.013)***</a:t>
+                      </a:r>
+                      <a:endParaRPr lang="en-US" sz="1100">
+                        <a:effectLst/>
+                      </a:endParaRPr>
+                    </a:p>
+                    <a:p>
+                      <a:pPr marL="0" marR="0" algn="l">
+                        <a:lnSpc>
+                          <a:spcPct val="115000"/>
+                        </a:lnSpc>
+                        <a:spcBef>
+                          <a:spcPts val="0"/>
+                        </a:spcBef>
+                        <a:spcAft>
+                          <a:spcPts val="0"/>
+                        </a:spcAft>
+                      </a:pPr>
+                      <a:r>
+                        <a:rPr lang="en-US" sz="800">
+                          <a:effectLst/>
+                        </a:rPr>
+                        <a:t>.342 (.034)***</a:t>
+                      </a:r>
+                      <a:endParaRPr lang="en-US" sz="1100">
+                        <a:effectLst/>
+                      </a:endParaRPr>
+                    </a:p>
+                    <a:p>
+                      <a:pPr marL="0" marR="0" algn="l">
+                        <a:lnSpc>
+                          <a:spcPct val="115000"/>
+                        </a:lnSpc>
+                        <a:spcBef>
+                          <a:spcPts val="0"/>
+                        </a:spcBef>
+                        <a:spcAft>
+                          <a:spcPts val="0"/>
+                        </a:spcAft>
+                      </a:pPr>
+                      <a:r>
+                        <a:rPr lang="en-US" sz="800">
+                          <a:effectLst/>
+                        </a:rPr>
+                        <a:t>.149 (.032)***</a:t>
+                      </a:r>
+                      <a:endParaRPr lang="en-US" sz="1100">
+                        <a:effectLst/>
+                        <a:latin typeface="Calibri" panose="020F0502020204030204" pitchFamily="34" charset="0"/>
+                        <a:ea typeface="MS Mincho" panose="02020609040205080304" pitchFamily="49" charset="-128"/>
+                        <a:cs typeface="Arial" panose="020B0604020202020204" pitchFamily="34" charset="0"/>
+                      </a:endParaRPr>
+                    </a:p>
+                  </a:txBody>
+                  <a:tcPr marL="68580" marR="68580" marT="0" marB="0"/>
+                </a:tc>
+              </a:tr>
+              <a:tr h="665679">
+                <a:tc>
+                  <a:txBody>
+                    <a:bodyPr/>
+                    <a:lstStyle/>
+                    <a:p>
+                      <a:pPr marL="0" marR="0" algn="l">
+                        <a:lnSpc>
+                          <a:spcPct val="115000"/>
+                        </a:lnSpc>
+                        <a:spcBef>
+                          <a:spcPts val="0"/>
+                        </a:spcBef>
+                        <a:spcAft>
+                          <a:spcPts val="0"/>
+                        </a:spcAft>
+                      </a:pPr>
+                      <a:r>
+                        <a:rPr lang="en-US" sz="800">
+                          <a:effectLst/>
+                        </a:rPr>
+                        <a:t>Ego Characteristics</a:t>
+                      </a:r>
+                      <a:endParaRPr lang="en-US" sz="1100">
+                        <a:effectLst/>
+                      </a:endParaRPr>
+                    </a:p>
+                    <a:p>
+                      <a:pPr marL="0" marR="0" algn="l">
+                        <a:lnSpc>
+                          <a:spcPct val="115000"/>
+                        </a:lnSpc>
+                        <a:spcBef>
+                          <a:spcPts val="0"/>
+                        </a:spcBef>
+                        <a:spcAft>
+                          <a:spcPts val="0"/>
+                        </a:spcAft>
+                      </a:pPr>
+                      <a:r>
+                        <a:rPr lang="en-US" sz="800">
+                          <a:effectLst/>
+                        </a:rPr>
+                        <a:t>Grade level</a:t>
+                      </a:r>
+                      <a:endParaRPr lang="en-US" sz="1100">
+                        <a:effectLst/>
+                      </a:endParaRPr>
+                    </a:p>
+                    <a:p>
+                      <a:pPr marL="0" marR="0" algn="l">
+                        <a:lnSpc>
+                          <a:spcPct val="115000"/>
+                        </a:lnSpc>
+                        <a:spcBef>
+                          <a:spcPts val="0"/>
+                        </a:spcBef>
+                        <a:spcAft>
+                          <a:spcPts val="0"/>
+                        </a:spcAft>
+                      </a:pPr>
+                      <a:r>
+                        <a:rPr lang="en-US" sz="800">
+                          <a:effectLst/>
+                        </a:rPr>
+                        <a:t>Core subjects GPA (4-point scale)</a:t>
+                      </a:r>
+                      <a:endParaRPr lang="en-US" sz="1100">
+                        <a:effectLst/>
+                        <a:latin typeface="Calibri" panose="020F0502020204030204" pitchFamily="34" charset="0"/>
+                        <a:ea typeface="MS Mincho" panose="02020609040205080304" pitchFamily="49" charset="-128"/>
+                        <a:cs typeface="Arial" panose="020B0604020202020204" pitchFamily="34" charset="0"/>
+                      </a:endParaRPr>
+                    </a:p>
+                  </a:txBody>
+                  <a:tcPr marL="68580" marR="68580" marT="0" marB="0"/>
+                </a:tc>
+                <a:tc>
+                  <a:txBody>
+                    <a:bodyPr/>
+                    <a:lstStyle/>
+                    <a:p>
+                      <a:pPr marL="0" marR="0" algn="l">
+                        <a:lnSpc>
+                          <a:spcPct val="115000"/>
+                        </a:lnSpc>
+                        <a:spcBef>
+                          <a:spcPts val="0"/>
+                        </a:spcBef>
+                        <a:spcAft>
+                          <a:spcPts val="0"/>
+                        </a:spcAft>
+                      </a:pPr>
+                      <a:r>
+                        <a:rPr lang="en-US" sz="800">
+                          <a:effectLst/>
+                        </a:rPr>
+                        <a:t> </a:t>
+                      </a:r>
+                      <a:endParaRPr lang="en-US" sz="1100">
+                        <a:effectLst/>
+                      </a:endParaRPr>
+                    </a:p>
+                    <a:p>
+                      <a:pPr marL="0" marR="0" algn="l">
+                        <a:lnSpc>
+                          <a:spcPct val="115000"/>
+                        </a:lnSpc>
+                        <a:spcBef>
+                          <a:spcPts val="0"/>
+                        </a:spcBef>
+                        <a:spcAft>
+                          <a:spcPts val="0"/>
+                        </a:spcAft>
+                      </a:pPr>
+                      <a:r>
+                        <a:rPr lang="en-US" sz="800">
+                          <a:effectLst/>
+                        </a:rPr>
+                        <a:t> </a:t>
+                      </a:r>
+                      <a:endParaRPr lang="en-US" sz="1100">
+                        <a:effectLst/>
+                        <a:latin typeface="Calibri" panose="020F0502020204030204" pitchFamily="34" charset="0"/>
+                        <a:ea typeface="MS Mincho" panose="02020609040205080304" pitchFamily="49" charset="-128"/>
+                        <a:cs typeface="Arial" panose="020B0604020202020204" pitchFamily="34" charset="0"/>
+                      </a:endParaRPr>
+                    </a:p>
+                  </a:txBody>
+                  <a:tcPr marL="68580" marR="68580" marT="0" marB="0"/>
+                </a:tc>
+                <a:tc>
+                  <a:txBody>
+                    <a:bodyPr/>
+                    <a:lstStyle/>
+                    <a:p>
+                      <a:pPr marL="0" marR="0" algn="l">
+                        <a:lnSpc>
+                          <a:spcPct val="115000"/>
+                        </a:lnSpc>
+                        <a:spcBef>
+                          <a:spcPts val="0"/>
+                        </a:spcBef>
+                        <a:spcAft>
+                          <a:spcPts val="0"/>
+                        </a:spcAft>
+                      </a:pPr>
+                      <a:r>
+                        <a:rPr lang="en-US" sz="800">
+                          <a:effectLst/>
+                        </a:rPr>
+                        <a:t> </a:t>
+                      </a:r>
+                      <a:endParaRPr lang="en-US" sz="1100">
+                        <a:effectLst/>
+                      </a:endParaRPr>
+                    </a:p>
+                    <a:p>
+                      <a:pPr marL="0" marR="0" algn="l">
+                        <a:lnSpc>
+                          <a:spcPct val="115000"/>
+                        </a:lnSpc>
+                        <a:spcBef>
+                          <a:spcPts val="0"/>
+                        </a:spcBef>
+                        <a:spcAft>
+                          <a:spcPts val="0"/>
+                        </a:spcAft>
+                      </a:pPr>
+                      <a:r>
+                        <a:rPr lang="en-US" sz="800">
+                          <a:effectLst/>
+                        </a:rPr>
+                        <a:t>.081 (.021)***</a:t>
+                      </a:r>
+                      <a:endParaRPr lang="en-US" sz="1100">
+                        <a:effectLst/>
+                      </a:endParaRPr>
+                    </a:p>
+                    <a:p>
+                      <a:pPr marL="0" marR="0" algn="l">
+                        <a:lnSpc>
+                          <a:spcPct val="115000"/>
+                        </a:lnSpc>
+                        <a:spcBef>
+                          <a:spcPts val="0"/>
+                        </a:spcBef>
+                        <a:spcAft>
+                          <a:spcPts val="0"/>
+                        </a:spcAft>
+                      </a:pPr>
+                      <a:r>
+                        <a:rPr lang="en-US" sz="800">
+                          <a:effectLst/>
+                        </a:rPr>
+                        <a:t>-.023 (.021)</a:t>
+                      </a:r>
+                      <a:endParaRPr lang="en-US" sz="1100">
+                        <a:effectLst/>
+                        <a:latin typeface="Calibri" panose="020F0502020204030204" pitchFamily="34" charset="0"/>
+                        <a:ea typeface="MS Mincho" panose="02020609040205080304" pitchFamily="49" charset="-128"/>
+                        <a:cs typeface="Arial" panose="020B0604020202020204" pitchFamily="34" charset="0"/>
+                      </a:endParaRPr>
+                    </a:p>
+                  </a:txBody>
+                  <a:tcPr marL="68580" marR="68580" marT="0" marB="0"/>
+                </a:tc>
+                <a:tc>
+                  <a:txBody>
+                    <a:bodyPr/>
+                    <a:lstStyle/>
+                    <a:p>
+                      <a:pPr marL="0" marR="0" algn="l">
+                        <a:lnSpc>
+                          <a:spcPct val="115000"/>
+                        </a:lnSpc>
+                        <a:spcBef>
+                          <a:spcPts val="0"/>
+                        </a:spcBef>
+                        <a:spcAft>
+                          <a:spcPts val="0"/>
+                        </a:spcAft>
+                      </a:pPr>
+                      <a:r>
+                        <a:rPr lang="en-US" sz="800">
+                          <a:effectLst/>
+                        </a:rPr>
+                        <a:t> </a:t>
+                      </a:r>
+                      <a:endParaRPr lang="en-US" sz="1100">
+                        <a:effectLst/>
+                      </a:endParaRPr>
+                    </a:p>
+                    <a:p>
+                      <a:pPr marL="0" marR="0" algn="l">
+                        <a:lnSpc>
+                          <a:spcPct val="115000"/>
+                        </a:lnSpc>
+                        <a:spcBef>
+                          <a:spcPts val="0"/>
+                        </a:spcBef>
+                        <a:spcAft>
+                          <a:spcPts val="0"/>
+                        </a:spcAft>
+                      </a:pPr>
+                      <a:r>
+                        <a:rPr lang="en-US" sz="800">
+                          <a:effectLst/>
+                        </a:rPr>
+                        <a:t>.048 (.022)*</a:t>
+                      </a:r>
+                      <a:endParaRPr lang="en-US" sz="1100">
+                        <a:effectLst/>
+                      </a:endParaRPr>
+                    </a:p>
+                    <a:p>
+                      <a:pPr marL="0" marR="0" algn="l">
+                        <a:lnSpc>
+                          <a:spcPct val="115000"/>
+                        </a:lnSpc>
+                        <a:spcBef>
+                          <a:spcPts val="0"/>
+                        </a:spcBef>
+                        <a:spcAft>
+                          <a:spcPts val="0"/>
+                        </a:spcAft>
+                      </a:pPr>
+                      <a:r>
+                        <a:rPr lang="en-US" sz="800">
+                          <a:effectLst/>
+                        </a:rPr>
+                        <a:t>-.030 (.021)</a:t>
+                      </a:r>
+                      <a:endParaRPr lang="en-US" sz="1100">
+                        <a:effectLst/>
+                        <a:latin typeface="Calibri" panose="020F0502020204030204" pitchFamily="34" charset="0"/>
+                        <a:ea typeface="MS Mincho" panose="02020609040205080304" pitchFamily="49" charset="-128"/>
+                        <a:cs typeface="Arial" panose="020B0604020202020204" pitchFamily="34" charset="0"/>
+                      </a:endParaRPr>
+                    </a:p>
+                  </a:txBody>
+                  <a:tcPr marL="68580" marR="68580" marT="0" marB="0"/>
+                </a:tc>
+                <a:tc>
+                  <a:txBody>
+                    <a:bodyPr/>
+                    <a:lstStyle/>
+                    <a:p>
+                      <a:pPr marL="0" marR="0" algn="l">
+                        <a:lnSpc>
+                          <a:spcPct val="115000"/>
+                        </a:lnSpc>
+                        <a:spcBef>
+                          <a:spcPts val="0"/>
+                        </a:spcBef>
+                        <a:spcAft>
+                          <a:spcPts val="0"/>
+                        </a:spcAft>
+                      </a:pPr>
+                      <a:r>
+                        <a:rPr lang="en-US" sz="800">
+                          <a:effectLst/>
+                        </a:rPr>
+                        <a:t> </a:t>
+                      </a:r>
+                      <a:endParaRPr lang="en-US" sz="1100">
+                        <a:effectLst/>
+                      </a:endParaRPr>
+                    </a:p>
+                    <a:p>
+                      <a:pPr marL="0" marR="0" algn="l">
+                        <a:lnSpc>
+                          <a:spcPct val="115000"/>
+                        </a:lnSpc>
+                        <a:spcBef>
+                          <a:spcPts val="0"/>
+                        </a:spcBef>
+                        <a:spcAft>
+                          <a:spcPts val="0"/>
+                        </a:spcAft>
+                      </a:pPr>
+                      <a:r>
+                        <a:rPr lang="en-US" sz="800">
+                          <a:effectLst/>
+                        </a:rPr>
+                        <a:t>.039 (.022)</a:t>
+                      </a:r>
+                      <a:endParaRPr lang="en-US" sz="1100">
+                        <a:effectLst/>
+                      </a:endParaRPr>
+                    </a:p>
+                    <a:p>
+                      <a:pPr marL="0" marR="0" algn="l">
+                        <a:lnSpc>
+                          <a:spcPct val="115000"/>
+                        </a:lnSpc>
+                        <a:spcBef>
+                          <a:spcPts val="0"/>
+                        </a:spcBef>
+                        <a:spcAft>
+                          <a:spcPts val="0"/>
+                        </a:spcAft>
+                      </a:pPr>
+                      <a:r>
+                        <a:rPr lang="en-US" sz="800">
+                          <a:effectLst/>
+                        </a:rPr>
+                        <a:t>-.030 (.022)</a:t>
+                      </a:r>
+                      <a:endParaRPr lang="en-US" sz="1100">
+                        <a:effectLst/>
+                        <a:latin typeface="Calibri" panose="020F0502020204030204" pitchFamily="34" charset="0"/>
+                        <a:ea typeface="MS Mincho" panose="02020609040205080304" pitchFamily="49" charset="-128"/>
+                        <a:cs typeface="Arial" panose="020B0604020202020204" pitchFamily="34" charset="0"/>
+                      </a:endParaRPr>
+                    </a:p>
+                  </a:txBody>
+                  <a:tcPr marL="68580" marR="68580" marT="0" marB="0"/>
+                </a:tc>
+              </a:tr>
+              <a:tr h="834858">
+                <a:tc>
+                  <a:txBody>
+                    <a:bodyPr/>
+                    <a:lstStyle/>
+                    <a:p>
+                      <a:pPr marL="0" marR="0" algn="l">
+                        <a:lnSpc>
+                          <a:spcPct val="115000"/>
+                        </a:lnSpc>
+                        <a:spcBef>
+                          <a:spcPts val="0"/>
+                        </a:spcBef>
+                        <a:spcAft>
+                          <a:spcPts val="0"/>
+                        </a:spcAft>
+                      </a:pPr>
+                      <a:r>
+                        <a:rPr lang="en-US" sz="800">
+                          <a:effectLst/>
+                        </a:rPr>
+                        <a:t>Network Structure &amp; Position</a:t>
+                      </a:r>
+                      <a:endParaRPr lang="en-US" sz="1100">
+                        <a:effectLst/>
+                      </a:endParaRPr>
+                    </a:p>
+                    <a:p>
+                      <a:pPr marL="0" marR="0" algn="l">
+                        <a:lnSpc>
+                          <a:spcPct val="115000"/>
+                        </a:lnSpc>
+                        <a:spcBef>
+                          <a:spcPts val="0"/>
+                        </a:spcBef>
+                        <a:spcAft>
+                          <a:spcPts val="0"/>
+                        </a:spcAft>
+                      </a:pPr>
+                      <a:r>
+                        <a:rPr lang="en-US" sz="800">
+                          <a:effectLst/>
+                        </a:rPr>
+                        <a:t>Outdegree</a:t>
+                      </a:r>
+                      <a:endParaRPr lang="en-US" sz="1100">
+                        <a:effectLst/>
+                      </a:endParaRPr>
+                    </a:p>
+                    <a:p>
+                      <a:pPr marL="0" marR="0" algn="l">
+                        <a:lnSpc>
+                          <a:spcPct val="115000"/>
+                        </a:lnSpc>
+                        <a:spcBef>
+                          <a:spcPts val="0"/>
+                        </a:spcBef>
+                        <a:spcAft>
+                          <a:spcPts val="0"/>
+                        </a:spcAft>
+                      </a:pPr>
+                      <a:r>
+                        <a:rPr lang="en-US" sz="800">
+                          <a:effectLst/>
+                        </a:rPr>
+                        <a:t>Bonacich (Prestige) Centrality</a:t>
+                      </a:r>
+                      <a:endParaRPr lang="en-US" sz="1100">
+                        <a:effectLst/>
+                        <a:latin typeface="Calibri" panose="020F0502020204030204" pitchFamily="34" charset="0"/>
+                        <a:ea typeface="MS Mincho" panose="02020609040205080304" pitchFamily="49" charset="-128"/>
+                        <a:cs typeface="Arial" panose="020B0604020202020204" pitchFamily="34" charset="0"/>
+                      </a:endParaRPr>
+                    </a:p>
+                  </a:txBody>
+                  <a:tcPr marL="68580" marR="68580" marT="0" marB="0"/>
+                </a:tc>
+                <a:tc>
+                  <a:txBody>
+                    <a:bodyPr/>
+                    <a:lstStyle/>
+                    <a:p>
+                      <a:pPr marL="0" marR="0" algn="l">
+                        <a:lnSpc>
+                          <a:spcPct val="115000"/>
+                        </a:lnSpc>
+                        <a:spcBef>
+                          <a:spcPts val="0"/>
+                        </a:spcBef>
+                        <a:spcAft>
+                          <a:spcPts val="0"/>
+                        </a:spcAft>
+                      </a:pPr>
+                      <a:r>
+                        <a:rPr lang="en-US" sz="800">
+                          <a:effectLst/>
+                        </a:rPr>
+                        <a:t> </a:t>
+                      </a:r>
+                      <a:endParaRPr lang="en-US" sz="1100">
+                        <a:effectLst/>
+                        <a:latin typeface="Calibri" panose="020F0502020204030204" pitchFamily="34" charset="0"/>
+                        <a:ea typeface="MS Mincho" panose="02020609040205080304" pitchFamily="49" charset="-128"/>
+                        <a:cs typeface="Arial" panose="020B0604020202020204" pitchFamily="34" charset="0"/>
+                      </a:endParaRPr>
+                    </a:p>
+                  </a:txBody>
+                  <a:tcPr marL="68580" marR="68580" marT="0" marB="0"/>
+                </a:tc>
+                <a:tc>
+                  <a:txBody>
+                    <a:bodyPr/>
+                    <a:lstStyle/>
+                    <a:p>
+                      <a:pPr marL="0" marR="0" algn="l">
+                        <a:lnSpc>
+                          <a:spcPct val="115000"/>
+                        </a:lnSpc>
+                        <a:spcBef>
+                          <a:spcPts val="0"/>
+                        </a:spcBef>
+                        <a:spcAft>
+                          <a:spcPts val="0"/>
+                        </a:spcAft>
+                      </a:pPr>
+                      <a:r>
+                        <a:rPr lang="en-US" sz="800">
+                          <a:effectLst/>
+                        </a:rPr>
+                        <a:t> </a:t>
+                      </a:r>
+                      <a:endParaRPr lang="en-US" sz="1100">
+                        <a:effectLst/>
+                        <a:latin typeface="Calibri" panose="020F0502020204030204" pitchFamily="34" charset="0"/>
+                        <a:ea typeface="MS Mincho" panose="02020609040205080304" pitchFamily="49" charset="-128"/>
+                        <a:cs typeface="Arial" panose="020B0604020202020204" pitchFamily="34" charset="0"/>
+                      </a:endParaRPr>
+                    </a:p>
+                  </a:txBody>
+                  <a:tcPr marL="68580" marR="68580" marT="0" marB="0"/>
+                </a:tc>
+                <a:tc>
+                  <a:txBody>
+                    <a:bodyPr/>
+                    <a:lstStyle/>
+                    <a:p>
+                      <a:pPr marL="0" marR="0" algn="l">
+                        <a:lnSpc>
+                          <a:spcPct val="115000"/>
+                        </a:lnSpc>
+                        <a:spcBef>
+                          <a:spcPts val="0"/>
+                        </a:spcBef>
+                        <a:spcAft>
+                          <a:spcPts val="0"/>
+                        </a:spcAft>
+                      </a:pPr>
+                      <a:r>
+                        <a:rPr lang="en-US" sz="800">
+                          <a:effectLst/>
+                        </a:rPr>
+                        <a:t> </a:t>
+                      </a:r>
+                      <a:endParaRPr lang="en-US" sz="1100">
+                        <a:effectLst/>
+                      </a:endParaRPr>
+                    </a:p>
+                    <a:p>
+                      <a:pPr marL="0" marR="0" algn="l">
+                        <a:lnSpc>
+                          <a:spcPct val="115000"/>
+                        </a:lnSpc>
+                        <a:spcBef>
+                          <a:spcPts val="0"/>
+                        </a:spcBef>
+                        <a:spcAft>
+                          <a:spcPts val="0"/>
+                        </a:spcAft>
+                      </a:pPr>
+                      <a:r>
+                        <a:rPr lang="en-US" sz="800">
+                          <a:effectLst/>
+                        </a:rPr>
+                        <a:t>-.067 (.011)***</a:t>
+                      </a:r>
+                      <a:endParaRPr lang="en-US" sz="1100">
+                        <a:effectLst/>
+                      </a:endParaRPr>
+                    </a:p>
+                    <a:p>
+                      <a:pPr marL="0" marR="0" algn="l">
+                        <a:lnSpc>
+                          <a:spcPct val="115000"/>
+                        </a:lnSpc>
+                        <a:spcBef>
+                          <a:spcPts val="0"/>
+                        </a:spcBef>
+                        <a:spcAft>
+                          <a:spcPts val="0"/>
+                        </a:spcAft>
+                      </a:pPr>
+                      <a:r>
+                        <a:rPr lang="en-US" sz="800">
+                          <a:effectLst/>
+                        </a:rPr>
+                        <a:t>.175 (.039)***</a:t>
+                      </a:r>
+                      <a:endParaRPr lang="en-US" sz="1100">
+                        <a:effectLst/>
+                        <a:latin typeface="Calibri" panose="020F0502020204030204" pitchFamily="34" charset="0"/>
+                        <a:ea typeface="MS Mincho" panose="02020609040205080304" pitchFamily="49" charset="-128"/>
+                        <a:cs typeface="Arial" panose="020B0604020202020204" pitchFamily="34" charset="0"/>
+                      </a:endParaRPr>
+                    </a:p>
+                  </a:txBody>
+                  <a:tcPr marL="68580" marR="68580" marT="0" marB="0"/>
+                </a:tc>
+                <a:tc>
+                  <a:txBody>
+                    <a:bodyPr/>
+                    <a:lstStyle/>
+                    <a:p>
+                      <a:pPr marL="0" marR="0" algn="l">
+                        <a:lnSpc>
+                          <a:spcPct val="115000"/>
+                        </a:lnSpc>
+                        <a:spcBef>
+                          <a:spcPts val="0"/>
+                        </a:spcBef>
+                        <a:spcAft>
+                          <a:spcPts val="0"/>
+                        </a:spcAft>
+                      </a:pPr>
+                      <a:r>
+                        <a:rPr lang="en-US" sz="800">
+                          <a:effectLst/>
+                        </a:rPr>
+                        <a:t> </a:t>
+                      </a:r>
+                      <a:endParaRPr lang="en-US" sz="1100">
+                        <a:effectLst/>
+                      </a:endParaRPr>
+                    </a:p>
+                    <a:p>
+                      <a:pPr marL="0" marR="0" algn="l">
+                        <a:lnSpc>
+                          <a:spcPct val="115000"/>
+                        </a:lnSpc>
+                        <a:spcBef>
+                          <a:spcPts val="0"/>
+                        </a:spcBef>
+                        <a:spcAft>
+                          <a:spcPts val="0"/>
+                        </a:spcAft>
+                      </a:pPr>
+                      <a:r>
+                        <a:rPr lang="en-US" sz="800">
+                          <a:effectLst/>
+                        </a:rPr>
+                        <a:t>-.033 (.014)*</a:t>
+                      </a:r>
+                      <a:endParaRPr lang="en-US" sz="1100">
+                        <a:effectLst/>
+                      </a:endParaRPr>
+                    </a:p>
+                    <a:p>
+                      <a:pPr marL="0" marR="0" algn="l">
+                        <a:lnSpc>
+                          <a:spcPct val="115000"/>
+                        </a:lnSpc>
+                        <a:spcBef>
+                          <a:spcPts val="0"/>
+                        </a:spcBef>
+                        <a:spcAft>
+                          <a:spcPts val="0"/>
+                        </a:spcAft>
+                      </a:pPr>
+                      <a:r>
+                        <a:rPr lang="en-US" sz="800">
+                          <a:effectLst/>
+                        </a:rPr>
+                        <a:t>.102 (.042)*</a:t>
+                      </a:r>
+                      <a:endParaRPr lang="en-US" sz="1100">
+                        <a:effectLst/>
+                        <a:latin typeface="Calibri" panose="020F0502020204030204" pitchFamily="34" charset="0"/>
+                        <a:ea typeface="MS Mincho" panose="02020609040205080304" pitchFamily="49" charset="-128"/>
+                        <a:cs typeface="Arial" panose="020B0604020202020204" pitchFamily="34" charset="0"/>
+                      </a:endParaRPr>
+                    </a:p>
+                  </a:txBody>
+                  <a:tcPr marL="68580" marR="68580" marT="0" marB="0"/>
+                </a:tc>
+              </a:tr>
+              <a:tr h="1680749">
+                <a:tc>
+                  <a:txBody>
+                    <a:bodyPr/>
+                    <a:lstStyle/>
+                    <a:p>
+                      <a:pPr marL="0" marR="0" algn="l">
+                        <a:lnSpc>
+                          <a:spcPct val="115000"/>
+                        </a:lnSpc>
+                        <a:spcBef>
+                          <a:spcPts val="0"/>
+                        </a:spcBef>
+                        <a:spcAft>
+                          <a:spcPts val="0"/>
+                        </a:spcAft>
+                      </a:pPr>
+                      <a:r>
+                        <a:rPr lang="en-US" sz="800">
+                          <a:effectLst/>
+                        </a:rPr>
+                        <a:t>Friend Network Attributes</a:t>
+                      </a:r>
+                      <a:endParaRPr lang="en-US" sz="1100">
+                        <a:effectLst/>
+                      </a:endParaRPr>
+                    </a:p>
+                    <a:p>
+                      <a:pPr marL="0" marR="0" algn="l">
+                        <a:lnSpc>
+                          <a:spcPct val="115000"/>
+                        </a:lnSpc>
+                        <a:spcBef>
+                          <a:spcPts val="0"/>
+                        </a:spcBef>
+                        <a:spcAft>
+                          <a:spcPts val="0"/>
+                        </a:spcAft>
+                      </a:pPr>
+                      <a:r>
+                        <a:rPr lang="en-US" sz="800">
+                          <a:effectLst/>
+                        </a:rPr>
+                        <a:t>     Ego Network Mean Scores</a:t>
+                      </a:r>
+                      <a:endParaRPr lang="en-US" sz="1100">
+                        <a:effectLst/>
+                      </a:endParaRPr>
+                    </a:p>
+                    <a:p>
+                      <a:pPr marL="0" marR="0" algn="l">
+                        <a:lnSpc>
+                          <a:spcPct val="115000"/>
+                        </a:lnSpc>
+                        <a:spcBef>
+                          <a:spcPts val="0"/>
+                        </a:spcBef>
+                        <a:spcAft>
+                          <a:spcPts val="0"/>
+                        </a:spcAft>
+                      </a:pPr>
+                      <a:r>
+                        <a:rPr lang="en-US" sz="800">
+                          <a:effectLst/>
+                        </a:rPr>
+                        <a:t>Proportion Claiming a Religion</a:t>
+                      </a:r>
+                      <a:endParaRPr lang="en-US" sz="1100">
+                        <a:effectLst/>
+                      </a:endParaRPr>
+                    </a:p>
+                    <a:p>
+                      <a:pPr marL="0" marR="0" algn="l">
+                        <a:lnSpc>
+                          <a:spcPct val="115000"/>
+                        </a:lnSpc>
+                        <a:spcBef>
+                          <a:spcPts val="0"/>
+                        </a:spcBef>
+                        <a:spcAft>
+                          <a:spcPts val="0"/>
+                        </a:spcAft>
+                      </a:pPr>
+                      <a:r>
+                        <a:rPr lang="en-US" sz="800">
+                          <a:effectLst/>
+                        </a:rPr>
+                        <a:t>Mean Worship Attendance</a:t>
+                      </a:r>
+                      <a:endParaRPr lang="en-US" sz="1100">
+                        <a:effectLst/>
+                      </a:endParaRPr>
+                    </a:p>
+                    <a:p>
+                      <a:pPr marL="0" marR="0" algn="l">
+                        <a:lnSpc>
+                          <a:spcPct val="115000"/>
+                        </a:lnSpc>
+                        <a:spcBef>
+                          <a:spcPts val="0"/>
+                        </a:spcBef>
+                        <a:spcAft>
+                          <a:spcPts val="0"/>
+                        </a:spcAft>
+                      </a:pPr>
+                      <a:r>
+                        <a:rPr lang="en-US" sz="800">
+                          <a:effectLst/>
+                        </a:rPr>
+                        <a:t>Mean Biblical Literalism</a:t>
+                      </a:r>
+                      <a:endParaRPr lang="en-US" sz="1100">
+                        <a:effectLst/>
+                      </a:endParaRPr>
+                    </a:p>
+                    <a:p>
+                      <a:pPr marL="0" marR="0" algn="l">
+                        <a:lnSpc>
+                          <a:spcPct val="115000"/>
+                        </a:lnSpc>
+                        <a:spcBef>
+                          <a:spcPts val="0"/>
+                        </a:spcBef>
+                        <a:spcAft>
+                          <a:spcPts val="0"/>
+                        </a:spcAft>
+                      </a:pPr>
+                      <a:r>
+                        <a:rPr lang="en-US" sz="800">
+                          <a:effectLst/>
+                        </a:rPr>
+                        <a:t>     Ego Network Heterogeneity</a:t>
+                      </a:r>
+                      <a:endParaRPr lang="en-US" sz="1100">
+                        <a:effectLst/>
+                      </a:endParaRPr>
+                    </a:p>
+                    <a:p>
+                      <a:pPr marL="0" marR="0" algn="l">
+                        <a:lnSpc>
+                          <a:spcPct val="115000"/>
+                        </a:lnSpc>
+                        <a:spcBef>
+                          <a:spcPts val="0"/>
+                        </a:spcBef>
+                        <a:spcAft>
+                          <a:spcPts val="0"/>
+                        </a:spcAft>
+                      </a:pPr>
+                      <a:r>
+                        <a:rPr lang="en-US" sz="800">
+                          <a:effectLst/>
+                        </a:rPr>
+                        <a:t>Racial/Ethnic Heterogeneity</a:t>
+                      </a:r>
+                      <a:endParaRPr lang="en-US" sz="1100">
+                        <a:effectLst/>
+                      </a:endParaRPr>
+                    </a:p>
+                    <a:p>
+                      <a:pPr marL="0" marR="0" algn="l">
+                        <a:lnSpc>
+                          <a:spcPct val="115000"/>
+                        </a:lnSpc>
+                        <a:spcBef>
+                          <a:spcPts val="0"/>
+                        </a:spcBef>
+                        <a:spcAft>
+                          <a:spcPts val="0"/>
+                        </a:spcAft>
+                      </a:pPr>
+                      <a:r>
+                        <a:rPr lang="en-US" sz="800">
+                          <a:effectLst/>
+                        </a:rPr>
+                        <a:t>Religious Heterogeneity</a:t>
+                      </a:r>
+                      <a:endParaRPr lang="en-US" sz="1100">
+                        <a:effectLst/>
+                        <a:latin typeface="Calibri" panose="020F0502020204030204" pitchFamily="34" charset="0"/>
+                        <a:ea typeface="MS Mincho" panose="02020609040205080304" pitchFamily="49" charset="-128"/>
+                        <a:cs typeface="Arial" panose="020B0604020202020204" pitchFamily="34" charset="0"/>
+                      </a:endParaRPr>
+                    </a:p>
+                  </a:txBody>
+                  <a:tcPr marL="68580" marR="68580" marT="0" marB="0"/>
+                </a:tc>
+                <a:tc>
+                  <a:txBody>
+                    <a:bodyPr/>
+                    <a:lstStyle/>
+                    <a:p>
+                      <a:pPr marL="0" marR="0" algn="l">
+                        <a:lnSpc>
+                          <a:spcPct val="115000"/>
+                        </a:lnSpc>
+                        <a:spcBef>
+                          <a:spcPts val="0"/>
+                        </a:spcBef>
+                        <a:spcAft>
+                          <a:spcPts val="0"/>
+                        </a:spcAft>
+                      </a:pPr>
+                      <a:r>
+                        <a:rPr lang="en-US" sz="800">
+                          <a:effectLst/>
+                        </a:rPr>
+                        <a:t> </a:t>
+                      </a:r>
+                      <a:endParaRPr lang="en-US" sz="1100">
+                        <a:effectLst/>
+                        <a:latin typeface="Calibri" panose="020F0502020204030204" pitchFamily="34" charset="0"/>
+                        <a:ea typeface="MS Mincho" panose="02020609040205080304" pitchFamily="49" charset="-128"/>
+                        <a:cs typeface="Arial" panose="020B0604020202020204" pitchFamily="34" charset="0"/>
+                      </a:endParaRPr>
+                    </a:p>
+                  </a:txBody>
+                  <a:tcPr marL="68580" marR="68580" marT="0" marB="0"/>
+                </a:tc>
+                <a:tc>
+                  <a:txBody>
+                    <a:bodyPr/>
+                    <a:lstStyle/>
+                    <a:p>
+                      <a:pPr marL="0" marR="0" algn="l">
+                        <a:lnSpc>
+                          <a:spcPct val="115000"/>
+                        </a:lnSpc>
+                        <a:spcBef>
+                          <a:spcPts val="0"/>
+                        </a:spcBef>
+                        <a:spcAft>
+                          <a:spcPts val="0"/>
+                        </a:spcAft>
+                      </a:pPr>
+                      <a:r>
+                        <a:rPr lang="en-US" sz="800">
+                          <a:effectLst/>
+                        </a:rPr>
+                        <a:t> </a:t>
+                      </a:r>
+                      <a:endParaRPr lang="en-US" sz="1100">
+                        <a:effectLst/>
+                        <a:latin typeface="Calibri" panose="020F0502020204030204" pitchFamily="34" charset="0"/>
+                        <a:ea typeface="MS Mincho" panose="02020609040205080304" pitchFamily="49" charset="-128"/>
+                        <a:cs typeface="Arial" panose="020B0604020202020204" pitchFamily="34" charset="0"/>
+                      </a:endParaRPr>
+                    </a:p>
+                  </a:txBody>
+                  <a:tcPr marL="68580" marR="68580" marT="0" marB="0"/>
+                </a:tc>
+                <a:tc>
+                  <a:txBody>
+                    <a:bodyPr/>
+                    <a:lstStyle/>
+                    <a:p>
+                      <a:pPr marL="0" marR="0" algn="l">
+                        <a:lnSpc>
+                          <a:spcPct val="115000"/>
+                        </a:lnSpc>
+                        <a:spcBef>
+                          <a:spcPts val="0"/>
+                        </a:spcBef>
+                        <a:spcAft>
+                          <a:spcPts val="0"/>
+                        </a:spcAft>
+                      </a:pPr>
+                      <a:r>
+                        <a:rPr lang="en-US" sz="800">
+                          <a:effectLst/>
+                        </a:rPr>
+                        <a:t> </a:t>
+                      </a:r>
+                      <a:endParaRPr lang="en-US" sz="1100">
+                        <a:effectLst/>
+                        <a:latin typeface="Calibri" panose="020F0502020204030204" pitchFamily="34" charset="0"/>
+                        <a:ea typeface="MS Mincho" panose="02020609040205080304" pitchFamily="49" charset="-128"/>
+                        <a:cs typeface="Arial" panose="020B0604020202020204" pitchFamily="34" charset="0"/>
+                      </a:endParaRPr>
+                    </a:p>
+                  </a:txBody>
+                  <a:tcPr marL="68580" marR="68580" marT="0" marB="0"/>
+                </a:tc>
+                <a:tc>
+                  <a:txBody>
+                    <a:bodyPr/>
+                    <a:lstStyle/>
+                    <a:p>
+                      <a:pPr marL="0" marR="0" algn="l">
+                        <a:lnSpc>
+                          <a:spcPct val="115000"/>
+                        </a:lnSpc>
+                        <a:spcBef>
+                          <a:spcPts val="0"/>
+                        </a:spcBef>
+                        <a:spcAft>
+                          <a:spcPts val="0"/>
+                        </a:spcAft>
+                      </a:pPr>
+                      <a:r>
+                        <a:rPr lang="en-US" sz="800">
+                          <a:effectLst/>
+                        </a:rPr>
+                        <a:t> </a:t>
+                      </a:r>
+                      <a:endParaRPr lang="en-US" sz="1100">
+                        <a:effectLst/>
+                      </a:endParaRPr>
+                    </a:p>
+                    <a:p>
+                      <a:pPr marL="0" marR="0" algn="l">
+                        <a:lnSpc>
+                          <a:spcPct val="115000"/>
+                        </a:lnSpc>
+                        <a:spcBef>
+                          <a:spcPts val="0"/>
+                        </a:spcBef>
+                        <a:spcAft>
+                          <a:spcPts val="0"/>
+                        </a:spcAft>
+                      </a:pPr>
+                      <a:r>
+                        <a:rPr lang="en-US" sz="800">
+                          <a:effectLst/>
+                        </a:rPr>
+                        <a:t> </a:t>
+                      </a:r>
+                      <a:endParaRPr lang="en-US" sz="1100">
+                        <a:effectLst/>
+                      </a:endParaRPr>
+                    </a:p>
+                    <a:p>
+                      <a:pPr marL="0" marR="0" algn="l">
+                        <a:lnSpc>
+                          <a:spcPct val="115000"/>
+                        </a:lnSpc>
+                        <a:spcBef>
+                          <a:spcPts val="0"/>
+                        </a:spcBef>
+                        <a:spcAft>
+                          <a:spcPts val="0"/>
+                        </a:spcAft>
+                      </a:pPr>
+                      <a:r>
+                        <a:rPr lang="en-US" sz="800">
+                          <a:effectLst/>
+                        </a:rPr>
+                        <a:t>.078 (.080)</a:t>
+                      </a:r>
+                      <a:endParaRPr lang="en-US" sz="1100">
+                        <a:effectLst/>
+                      </a:endParaRPr>
+                    </a:p>
+                    <a:p>
+                      <a:pPr marL="0" marR="0" algn="l">
+                        <a:lnSpc>
+                          <a:spcPct val="115000"/>
+                        </a:lnSpc>
+                        <a:spcBef>
+                          <a:spcPts val="0"/>
+                        </a:spcBef>
+                        <a:spcAft>
+                          <a:spcPts val="0"/>
+                        </a:spcAft>
+                      </a:pPr>
+                      <a:r>
+                        <a:rPr lang="en-US" sz="800">
+                          <a:effectLst/>
+                        </a:rPr>
+                        <a:t>.049 (.021)*</a:t>
+                      </a:r>
+                      <a:endParaRPr lang="en-US" sz="1100">
+                        <a:effectLst/>
+                      </a:endParaRPr>
+                    </a:p>
+                    <a:p>
+                      <a:pPr marL="0" marR="0" algn="l">
+                        <a:lnSpc>
+                          <a:spcPct val="115000"/>
+                        </a:lnSpc>
+                        <a:spcBef>
+                          <a:spcPts val="0"/>
+                        </a:spcBef>
+                        <a:spcAft>
+                          <a:spcPts val="0"/>
+                        </a:spcAft>
+                      </a:pPr>
+                      <a:r>
+                        <a:rPr lang="en-US" sz="800">
+                          <a:effectLst/>
+                        </a:rPr>
+                        <a:t>.132 (.055)*</a:t>
+                      </a:r>
+                      <a:endParaRPr lang="en-US" sz="1100">
+                        <a:effectLst/>
+                      </a:endParaRPr>
+                    </a:p>
+                    <a:p>
+                      <a:pPr marL="0" marR="0" algn="l">
+                        <a:lnSpc>
+                          <a:spcPct val="115000"/>
+                        </a:lnSpc>
+                        <a:spcBef>
+                          <a:spcPts val="0"/>
+                        </a:spcBef>
+                        <a:spcAft>
+                          <a:spcPts val="0"/>
+                        </a:spcAft>
+                      </a:pPr>
+                      <a:r>
+                        <a:rPr lang="en-US" sz="800">
+                          <a:effectLst/>
+                        </a:rPr>
+                        <a:t> </a:t>
+                      </a:r>
+                      <a:endParaRPr lang="en-US" sz="1100">
+                        <a:effectLst/>
+                      </a:endParaRPr>
+                    </a:p>
+                    <a:p>
+                      <a:pPr marL="0" marR="0" algn="l">
+                        <a:lnSpc>
+                          <a:spcPct val="115000"/>
+                        </a:lnSpc>
+                        <a:spcBef>
+                          <a:spcPts val="0"/>
+                        </a:spcBef>
+                        <a:spcAft>
+                          <a:spcPts val="0"/>
+                        </a:spcAft>
+                      </a:pPr>
+                      <a:r>
+                        <a:rPr lang="en-US" sz="800">
+                          <a:effectLst/>
+                        </a:rPr>
+                        <a:t>.181 (.094)</a:t>
+                      </a:r>
+                      <a:endParaRPr lang="en-US" sz="1100">
+                        <a:effectLst/>
+                      </a:endParaRPr>
+                    </a:p>
+                    <a:p>
+                      <a:pPr marL="0" marR="0" algn="l">
+                        <a:lnSpc>
+                          <a:spcPct val="115000"/>
+                        </a:lnSpc>
+                        <a:spcBef>
+                          <a:spcPts val="0"/>
+                        </a:spcBef>
+                        <a:spcAft>
+                          <a:spcPts val="0"/>
+                        </a:spcAft>
+                      </a:pPr>
+                      <a:r>
+                        <a:rPr lang="en-US" sz="800">
+                          <a:effectLst/>
+                        </a:rPr>
+                        <a:t>-.200 (.068)**</a:t>
+                      </a:r>
+                      <a:endParaRPr lang="en-US" sz="1100">
+                        <a:effectLst/>
+                        <a:latin typeface="Calibri" panose="020F0502020204030204" pitchFamily="34" charset="0"/>
+                        <a:ea typeface="MS Mincho" panose="02020609040205080304" pitchFamily="49" charset="-128"/>
+                        <a:cs typeface="Arial" panose="020B0604020202020204" pitchFamily="34" charset="0"/>
+                      </a:endParaRPr>
+                    </a:p>
+                  </a:txBody>
+                  <a:tcPr marL="68580" marR="68580" marT="0" marB="0"/>
+                </a:tc>
+              </a:tr>
+              <a:tr h="158145">
+                <a:tc>
+                  <a:txBody>
+                    <a:bodyPr/>
+                    <a:lstStyle/>
+                    <a:p>
+                      <a:pPr marL="0" marR="0" algn="l">
+                        <a:lnSpc>
+                          <a:spcPct val="115000"/>
+                        </a:lnSpc>
+                        <a:spcBef>
+                          <a:spcPts val="0"/>
+                        </a:spcBef>
+                        <a:spcAft>
+                          <a:spcPts val="0"/>
+                        </a:spcAft>
+                      </a:pPr>
+                      <a:r>
+                        <a:rPr lang="en-US" sz="800">
+                          <a:effectLst/>
+                        </a:rPr>
+                        <a:t>Constant</a:t>
+                      </a:r>
+                      <a:endParaRPr lang="en-US" sz="1100">
+                        <a:effectLst/>
+                        <a:latin typeface="Calibri" panose="020F0502020204030204" pitchFamily="34" charset="0"/>
+                        <a:ea typeface="MS Mincho" panose="02020609040205080304" pitchFamily="49" charset="-128"/>
+                        <a:cs typeface="Arial" panose="020B0604020202020204" pitchFamily="34" charset="0"/>
+                      </a:endParaRPr>
+                    </a:p>
+                  </a:txBody>
+                  <a:tcPr marL="68580" marR="68580" marT="0" marB="0"/>
+                </a:tc>
+                <a:tc>
+                  <a:txBody>
+                    <a:bodyPr/>
+                    <a:lstStyle/>
+                    <a:p>
+                      <a:pPr marL="0" marR="0" algn="l">
+                        <a:lnSpc>
+                          <a:spcPct val="115000"/>
+                        </a:lnSpc>
+                        <a:spcBef>
+                          <a:spcPts val="0"/>
+                        </a:spcBef>
+                        <a:spcAft>
+                          <a:spcPts val="0"/>
+                        </a:spcAft>
+                      </a:pPr>
+                      <a:r>
+                        <a:rPr lang="en-US" sz="800">
+                          <a:effectLst/>
+                        </a:rPr>
+                        <a:t>.870 (.048)***</a:t>
+                      </a:r>
+                      <a:endParaRPr lang="en-US" sz="1100">
+                        <a:effectLst/>
+                        <a:latin typeface="Calibri" panose="020F0502020204030204" pitchFamily="34" charset="0"/>
+                        <a:ea typeface="MS Mincho" panose="02020609040205080304" pitchFamily="49" charset="-128"/>
+                        <a:cs typeface="Arial" panose="020B0604020202020204" pitchFamily="34" charset="0"/>
+                      </a:endParaRPr>
+                    </a:p>
+                  </a:txBody>
+                  <a:tcPr marL="68580" marR="68580" marT="0" marB="0"/>
+                </a:tc>
+                <a:tc>
+                  <a:txBody>
+                    <a:bodyPr/>
+                    <a:lstStyle/>
+                    <a:p>
+                      <a:pPr marL="0" marR="0" algn="l">
+                        <a:lnSpc>
+                          <a:spcPct val="115000"/>
+                        </a:lnSpc>
+                        <a:spcBef>
+                          <a:spcPts val="0"/>
+                        </a:spcBef>
+                        <a:spcAft>
+                          <a:spcPts val="0"/>
+                        </a:spcAft>
+                      </a:pPr>
+                      <a:r>
+                        <a:rPr lang="en-US" sz="800">
+                          <a:effectLst/>
+                        </a:rPr>
+                        <a:t>.080 (.247)</a:t>
+                      </a:r>
+                      <a:endParaRPr lang="en-US" sz="1100">
+                        <a:effectLst/>
+                        <a:latin typeface="Calibri" panose="020F0502020204030204" pitchFamily="34" charset="0"/>
+                        <a:ea typeface="MS Mincho" panose="02020609040205080304" pitchFamily="49" charset="-128"/>
+                        <a:cs typeface="Arial" panose="020B0604020202020204" pitchFamily="34" charset="0"/>
+                      </a:endParaRPr>
+                    </a:p>
+                  </a:txBody>
+                  <a:tcPr marL="68580" marR="68580" marT="0" marB="0"/>
+                </a:tc>
+                <a:tc>
+                  <a:txBody>
+                    <a:bodyPr/>
+                    <a:lstStyle/>
+                    <a:p>
+                      <a:pPr marL="0" marR="0" algn="l">
+                        <a:lnSpc>
+                          <a:spcPct val="115000"/>
+                        </a:lnSpc>
+                        <a:spcBef>
+                          <a:spcPts val="0"/>
+                        </a:spcBef>
+                        <a:spcAft>
+                          <a:spcPts val="0"/>
+                        </a:spcAft>
+                      </a:pPr>
+                      <a:r>
+                        <a:rPr lang="en-US" sz="800">
+                          <a:effectLst/>
+                        </a:rPr>
+                        <a:t>.551 (.263)*</a:t>
+                      </a:r>
+                      <a:endParaRPr lang="en-US" sz="1100">
+                        <a:effectLst/>
+                        <a:latin typeface="Calibri" panose="020F0502020204030204" pitchFamily="34" charset="0"/>
+                        <a:ea typeface="MS Mincho" panose="02020609040205080304" pitchFamily="49" charset="-128"/>
+                        <a:cs typeface="Arial" panose="020B0604020202020204" pitchFamily="34" charset="0"/>
+                      </a:endParaRPr>
+                    </a:p>
+                  </a:txBody>
+                  <a:tcPr marL="68580" marR="68580" marT="0" marB="0"/>
+                </a:tc>
+                <a:tc>
+                  <a:txBody>
+                    <a:bodyPr/>
+                    <a:lstStyle/>
+                    <a:p>
+                      <a:pPr marL="0" marR="0" algn="l">
+                        <a:lnSpc>
+                          <a:spcPct val="115000"/>
+                        </a:lnSpc>
+                        <a:spcBef>
+                          <a:spcPts val="0"/>
+                        </a:spcBef>
+                        <a:spcAft>
+                          <a:spcPts val="0"/>
+                        </a:spcAft>
+                      </a:pPr>
+                      <a:r>
+                        <a:rPr lang="en-US" sz="800" dirty="0">
+                          <a:effectLst/>
+                        </a:rPr>
+                        <a:t>.443 (.278)</a:t>
+                      </a:r>
+                      <a:endParaRPr lang="en-US" sz="1100" dirty="0">
+                        <a:effectLst/>
+                        <a:latin typeface="Calibri" panose="020F0502020204030204" pitchFamily="34" charset="0"/>
+                        <a:ea typeface="MS Mincho" panose="02020609040205080304" pitchFamily="49" charset="-128"/>
+                        <a:cs typeface="Arial" panose="020B0604020202020204" pitchFamily="34" charset="0"/>
+                      </a:endParaRPr>
+                    </a:p>
+                  </a:txBody>
+                  <a:tcPr marL="68580" marR="68580" marT="0" marB="0"/>
+                </a:tc>
+              </a:tr>
+            </a:tbl>
+          </a:graphicData>
+        </a:graphic>
+      </p:graphicFrame>
+      <p:sp>
+        <p:nvSpPr>
+          <p:cNvPr id="5" name="Rectangle 1"/>
+          <p:cNvSpPr>
+            <a:spLocks noChangeArrowheads="1"/>
+          </p:cNvSpPr>
+          <p:nvPr/>
+        </p:nvSpPr>
+        <p:spPr bwMode="auto">
+          <a:xfrm>
+            <a:off x="0" y="227260"/>
+            <a:ext cx="12287242" cy="276999"/>
+          </a:xfrm>
+          <a:prstGeom prst="rect">
+            <a:avLst/>
+          </a:prstGeom>
+          <a:noFill/>
+          <a:ln>
+            <a:noFill/>
+          </a:ln>
+          <a:effectLst/>
+          <a:extLst>
+            <a:ext uri="{909E8E84-426E-40DD-AFC4-6F175D3DCCD1}">
+              <a14:hiddenFill xmlns:a14="http://schemas.microsoft.com/office/drawing/2010/main">
+                <a:solidFill>
+                  <a:schemeClr val="accent1"/>
+                </a:solidFill>
+              </a14:hiddenFill>
+            </a:ext>
+            <a:ext uri="{91240B29-F687-4F45-9708-019B960494DF}">
+              <a14:hiddenLine xmlns:a14="http://schemas.microsoft.com/office/drawing/2010/main" w="9525">
+                <a:solidFill>
+                  <a:schemeClr val="tx1"/>
+                </a:solidFill>
+                <a:miter lim="800000"/>
+                <a:headEnd/>
+                <a:tailEnd/>
+              </a14:hiddenLine>
+            </a:ext>
+            <a:ext uri="{AF507438-7753-43E0-B8FC-AC1667EBCBE1}">
+              <a14:hiddenEffects xmlns:a14="http://schemas.microsoft.com/office/drawing/2010/main">
+                <a:effectLst>
+                  <a:outerShdw dist="35921" dir="2700000" algn="ctr" rotWithShape="0">
+                    <a:schemeClr val="bg2"/>
+                  </a:outerShdw>
+                </a:effectLst>
+              </a14:hiddenEffects>
+            </a:ext>
+          </a:extLst>
+        </p:spPr>
+        <p:txBody>
+          <a:bodyPr vert="horz" wrap="square" lIns="91440" tIns="45720" rIns="91440" bIns="45720" numCol="1" anchor="ctr" anchorCtr="0" compatLnSpc="1">
+            <a:prstTxWarp prst="textNoShape">
+              <a:avLst/>
+            </a:prstTxWarp>
+            <a:spAutoFit/>
+          </a:bodyPr>
+          <a:lstStyle>
+            <a:lvl1pPr eaLnBrk="0" fontAlgn="base" hangingPunct="0">
+              <a:spcBef>
+                <a:spcPct val="0"/>
+              </a:spcBef>
+              <a:spcAft>
+                <a:spcPct val="0"/>
+              </a:spcAft>
+              <a:defRPr>
+                <a:solidFill>
+                  <a:schemeClr val="tx1"/>
+                </a:solidFill>
+                <a:latin typeface="Arial" panose="020B0604020202020204" pitchFamily="34" charset="0"/>
+              </a:defRPr>
+            </a:lvl1pPr>
+            <a:lvl2pPr eaLnBrk="0" fontAlgn="base" hangingPunct="0">
+              <a:spcBef>
+                <a:spcPct val="0"/>
+              </a:spcBef>
+              <a:spcAft>
+                <a:spcPct val="0"/>
+              </a:spcAft>
+              <a:defRPr>
+                <a:solidFill>
+                  <a:schemeClr val="tx1"/>
+                </a:solidFill>
+                <a:latin typeface="Arial" panose="020B0604020202020204" pitchFamily="34" charset="0"/>
+              </a:defRPr>
+            </a:lvl2pPr>
+            <a:lvl3pPr eaLnBrk="0" fontAlgn="base" hangingPunct="0">
+              <a:spcBef>
+                <a:spcPct val="0"/>
+              </a:spcBef>
+              <a:spcAft>
+                <a:spcPct val="0"/>
+              </a:spcAft>
+              <a:defRPr>
+                <a:solidFill>
+                  <a:schemeClr val="tx1"/>
+                </a:solidFill>
+                <a:latin typeface="Arial" panose="020B0604020202020204" pitchFamily="34" charset="0"/>
+              </a:defRPr>
+            </a:lvl3pPr>
+            <a:lvl4pPr eaLnBrk="0" fontAlgn="base" hangingPunct="0">
+              <a:spcBef>
+                <a:spcPct val="0"/>
+              </a:spcBef>
+              <a:spcAft>
+                <a:spcPct val="0"/>
+              </a:spcAft>
+              <a:defRPr>
+                <a:solidFill>
+                  <a:schemeClr val="tx1"/>
+                </a:solidFill>
+                <a:latin typeface="Arial" panose="020B0604020202020204" pitchFamily="34" charset="0"/>
+              </a:defRPr>
+            </a:lvl4pPr>
+            <a:lvl5pPr eaLnBrk="0" fontAlgn="base" hangingPunct="0">
+              <a:spcBef>
+                <a:spcPct val="0"/>
+              </a:spcBef>
+              <a:spcAft>
+                <a:spcPct val="0"/>
+              </a:spcAft>
+              <a:defRPr>
+                <a:solidFill>
+                  <a:schemeClr val="tx1"/>
+                </a:solidFill>
+                <a:latin typeface="Arial" panose="020B0604020202020204" pitchFamily="34" charset="0"/>
+              </a:defRPr>
+            </a:lvl5pPr>
+            <a:lvl6pPr eaLnBrk="0" fontAlgn="base" hangingPunct="0">
+              <a:spcBef>
+                <a:spcPct val="0"/>
+              </a:spcBef>
+              <a:spcAft>
+                <a:spcPct val="0"/>
+              </a:spcAft>
+              <a:defRPr>
+                <a:solidFill>
+                  <a:schemeClr val="tx1"/>
+                </a:solidFill>
+                <a:latin typeface="Arial" panose="020B0604020202020204" pitchFamily="34" charset="0"/>
+              </a:defRPr>
+            </a:lvl6pPr>
+            <a:lvl7pPr eaLnBrk="0" fontAlgn="base" hangingPunct="0">
+              <a:spcBef>
+                <a:spcPct val="0"/>
+              </a:spcBef>
+              <a:spcAft>
+                <a:spcPct val="0"/>
+              </a:spcAft>
+              <a:defRPr>
+                <a:solidFill>
+                  <a:schemeClr val="tx1"/>
+                </a:solidFill>
+                <a:latin typeface="Arial" panose="020B0604020202020204" pitchFamily="34" charset="0"/>
+              </a:defRPr>
+            </a:lvl7pPr>
+            <a:lvl8pPr eaLnBrk="0" fontAlgn="base" hangingPunct="0">
+              <a:spcBef>
+                <a:spcPct val="0"/>
+              </a:spcBef>
+              <a:spcAft>
+                <a:spcPct val="0"/>
+              </a:spcAft>
+              <a:defRPr>
+                <a:solidFill>
+                  <a:schemeClr val="tx1"/>
+                </a:solidFill>
+                <a:latin typeface="Arial" panose="020B0604020202020204" pitchFamily="34" charset="0"/>
+              </a:defRPr>
+            </a:lvl8pPr>
+            <a:lvl9pPr eaLnBrk="0" fontAlgn="base" hangingPunct="0">
+              <a:spcBef>
+                <a:spcPct val="0"/>
+              </a:spcBef>
+              <a:spcAft>
+                <a:spcPct val="0"/>
+              </a:spcAft>
+              <a:defRPr>
+                <a:solidFill>
+                  <a:schemeClr val="tx1"/>
+                </a:solidFill>
+                <a:latin typeface="Arial" panose="020B0604020202020204" pitchFamily="34" charset="0"/>
+              </a:defRPr>
+            </a:lvl9pPr>
+          </a:lstStyle>
+          <a:p>
+            <a:pPr marL="0" marR="0" lvl="0" indent="0" algn="ctr" defTabSz="914400" rtl="0" eaLnBrk="0" fontAlgn="base" latinLnBrk="0" hangingPunct="0">
+              <a:lnSpc>
+                <a:spcPct val="100000"/>
+              </a:lnSpc>
+              <a:spcBef>
+                <a:spcPct val="0"/>
+              </a:spcBef>
+              <a:spcAft>
+                <a:spcPct val="0"/>
+              </a:spcAft>
+              <a:buClrTx/>
+              <a:buSzTx/>
+              <a:buFontTx/>
+              <a:buNone/>
+              <a:tabLst/>
+            </a:pPr>
+            <a:r>
+              <a:rPr kumimoji="0" lang="en-US" sz="1200" b="0" i="0" u="none" strike="noStrike" cap="none" normalizeH="0" baseline="0" smtClean="0">
+                <a:ln>
+                  <a:noFill/>
+                </a:ln>
+                <a:solidFill>
+                  <a:schemeClr val="tx1"/>
+                </a:solidFill>
+                <a:effectLst/>
+                <a:latin typeface="Calibri" panose="020F0502020204030204" pitchFamily="34" charset="0"/>
+                <a:ea typeface="MS Mincho" panose="02020609040205080304" pitchFamily="49" charset="-128"/>
+                <a:cs typeface="Arial" panose="020B0604020202020204" pitchFamily="34" charset="0"/>
+              </a:rPr>
+              <a:t>Table IV: Two-wave Fixed Effects Regression on Subjective Religious Importance (N=2724)</a:t>
+            </a:r>
+            <a:endParaRPr kumimoji="0" lang="en-US" sz="1800" b="0" i="0" u="none" strike="noStrike" cap="none" normalizeH="0" baseline="0" smtClean="0">
+              <a:ln>
+                <a:noFill/>
+              </a:ln>
+              <a:solidFill>
+                <a:schemeClr val="tx1"/>
+              </a:solidFill>
+              <a:effectLst/>
+              <a:latin typeface="Arial" panose="020B0604020202020204" pitchFamily="34" charset="0"/>
+            </a:endParaRPr>
+          </a:p>
+        </p:txBody>
+      </p:sp>
+    </p:spTree>
+    <p:extLst>
+      <p:ext uri="{BB962C8B-B14F-4D97-AF65-F5344CB8AC3E}">
+        <p14:creationId xmlns:p14="http://schemas.microsoft.com/office/powerpoint/2010/main" val="3244848651"/>
+      </p:ext>
+    </p:extLst>
+  </p:cSld>
+  <p:clrMapOvr>
+    <a:masterClrMapping/>
+  </p:clrMapOvr>
+  <p:timing>
+    <p:tnLst>
+      <p:par>
+        <p:cTn id="1" dur="indefinite" restart="never" nodeType="tmRoot"/>
+      </p:par>
+    </p:tnLst>
+  </p:timing>
+</p:sld>
+</file>
+
+<file path=ppt/slides/slide18.xml><?xml version="1.0" encoding="utf-8"?>
 <p:sld xmlns:a="http://schemas.openxmlformats.org/drawingml/2006/main" xmlns:r="http://schemas.openxmlformats.org/officeDocument/2006/relationships" xmlns:p="http://schemas.openxmlformats.org/presentationml/2006/main">
   <p:cSld>
     <p:spTree>

</xml_diff>